<commit_message>
references have been added
</commit_message>
<xml_diff>
--- a/1-html-css/01. HTML5 개요 및 레이아웃.pptx
+++ b/1-html-css/01. HTML5 개요 및 레이아웃.pptx
@@ -30,6 +30,7 @@
     <p:sldId id="275" r:id="rId24"/>
     <p:sldId id="297" r:id="rId25"/>
     <p:sldId id="288" r:id="rId26"/>
+    <p:sldId id="303" r:id="rId27"/>
   </p:sldIdLst>
   <p:sldSz cx="9144000" cy="6858000" type="screen4x3"/>
   <p:notesSz cx="6858000" cy="9144000"/>
@@ -329,7 +330,7 @@
             <a:fld id="{1879488F-3623-45BC-9557-A09A3AFFDD11}" type="datetimeFigureOut">
               <a:rPr lang="ko-KR" altLang="en-US" smtClean="0"/>
               <a:pPr/>
-              <a:t>2021-07-13</a:t>
+              <a:t>2021-07-14</a:t>
             </a:fld>
             <a:endParaRPr lang="ko-KR" altLang="en-US"/>
           </a:p>
@@ -496,7 +497,7 @@
             <a:fld id="{1879488F-3623-45BC-9557-A09A3AFFDD11}" type="datetimeFigureOut">
               <a:rPr lang="ko-KR" altLang="en-US" smtClean="0"/>
               <a:pPr/>
-              <a:t>2021-07-13</a:t>
+              <a:t>2021-07-14</a:t>
             </a:fld>
             <a:endParaRPr lang="ko-KR" altLang="en-US"/>
           </a:p>
@@ -673,7 +674,7 @@
             <a:fld id="{1879488F-3623-45BC-9557-A09A3AFFDD11}" type="datetimeFigureOut">
               <a:rPr lang="ko-KR" altLang="en-US" smtClean="0"/>
               <a:pPr/>
-              <a:t>2021-07-13</a:t>
+              <a:t>2021-07-14</a:t>
             </a:fld>
             <a:endParaRPr lang="ko-KR" altLang="en-US"/>
           </a:p>
@@ -840,7 +841,7 @@
             <a:fld id="{1879488F-3623-45BC-9557-A09A3AFFDD11}" type="datetimeFigureOut">
               <a:rPr lang="ko-KR" altLang="en-US" smtClean="0"/>
               <a:pPr/>
-              <a:t>2021-07-13</a:t>
+              <a:t>2021-07-14</a:t>
             </a:fld>
             <a:endParaRPr lang="ko-KR" altLang="en-US"/>
           </a:p>
@@ -1083,7 +1084,7 @@
             <a:fld id="{1879488F-3623-45BC-9557-A09A3AFFDD11}" type="datetimeFigureOut">
               <a:rPr lang="ko-KR" altLang="en-US" smtClean="0"/>
               <a:pPr/>
-              <a:t>2021-07-13</a:t>
+              <a:t>2021-07-14</a:t>
             </a:fld>
             <a:endParaRPr lang="ko-KR" altLang="en-US"/>
           </a:p>
@@ -1368,7 +1369,7 @@
             <a:fld id="{1879488F-3623-45BC-9557-A09A3AFFDD11}" type="datetimeFigureOut">
               <a:rPr lang="ko-KR" altLang="en-US" smtClean="0"/>
               <a:pPr/>
-              <a:t>2021-07-13</a:t>
+              <a:t>2021-07-14</a:t>
             </a:fld>
             <a:endParaRPr lang="ko-KR" altLang="en-US"/>
           </a:p>
@@ -1787,7 +1788,7 @@
             <a:fld id="{1879488F-3623-45BC-9557-A09A3AFFDD11}" type="datetimeFigureOut">
               <a:rPr lang="ko-KR" altLang="en-US" smtClean="0"/>
               <a:pPr/>
-              <a:t>2021-07-13</a:t>
+              <a:t>2021-07-14</a:t>
             </a:fld>
             <a:endParaRPr lang="ko-KR" altLang="en-US"/>
           </a:p>
@@ -1902,7 +1903,7 @@
             <a:fld id="{1879488F-3623-45BC-9557-A09A3AFFDD11}" type="datetimeFigureOut">
               <a:rPr lang="ko-KR" altLang="en-US" smtClean="0"/>
               <a:pPr/>
-              <a:t>2021-07-13</a:t>
+              <a:t>2021-07-14</a:t>
             </a:fld>
             <a:endParaRPr lang="ko-KR" altLang="en-US"/>
           </a:p>
@@ -1994,7 +1995,7 @@
             <a:fld id="{1879488F-3623-45BC-9557-A09A3AFFDD11}" type="datetimeFigureOut">
               <a:rPr lang="ko-KR" altLang="en-US" smtClean="0"/>
               <a:pPr/>
-              <a:t>2021-07-13</a:t>
+              <a:t>2021-07-14</a:t>
             </a:fld>
             <a:endParaRPr lang="ko-KR" altLang="en-US"/>
           </a:p>
@@ -2268,7 +2269,7 @@
             <a:fld id="{1879488F-3623-45BC-9557-A09A3AFFDD11}" type="datetimeFigureOut">
               <a:rPr lang="ko-KR" altLang="en-US" smtClean="0"/>
               <a:pPr/>
-              <a:t>2021-07-13</a:t>
+              <a:t>2021-07-14</a:t>
             </a:fld>
             <a:endParaRPr lang="ko-KR" altLang="en-US"/>
           </a:p>
@@ -2518,7 +2519,7 @@
             <a:fld id="{1879488F-3623-45BC-9557-A09A3AFFDD11}" type="datetimeFigureOut">
               <a:rPr lang="ko-KR" altLang="en-US" smtClean="0"/>
               <a:pPr/>
-              <a:t>2021-07-13</a:t>
+              <a:t>2021-07-14</a:t>
             </a:fld>
             <a:endParaRPr lang="ko-KR" altLang="en-US"/>
           </a:p>
@@ -2728,7 +2729,7 @@
             <a:fld id="{1879488F-3623-45BC-9557-A09A3AFFDD11}" type="datetimeFigureOut">
               <a:rPr lang="ko-KR" altLang="en-US" smtClean="0"/>
               <a:pPr/>
-              <a:t>2021-07-13</a:t>
+              <a:t>2021-07-14</a:t>
             </a:fld>
             <a:endParaRPr lang="ko-KR" altLang="en-US"/>
           </a:p>
@@ -4628,11 +4629,7 @@
             </a:r>
             <a:r>
               <a:rPr lang="en-US" altLang="ko-KR" sz="3000" dirty="0" smtClean="0"/>
-              <a:t> </a:t>
-            </a:r>
-            <a:r>
-              <a:rPr lang="en-US" altLang="ko-KR" sz="3000" dirty="0" smtClean="0"/>
-              <a:t>– </a:t>
+              <a:t> – </a:t>
             </a:r>
             <a:r>
               <a:rPr lang="ko-KR" altLang="en-US" sz="3000" dirty="0" smtClean="0"/>
@@ -4655,11 +4652,7 @@
             </a:r>
             <a:r>
               <a:rPr lang="en-US" altLang="ko-KR" sz="3000" dirty="0" smtClean="0"/>
-              <a:t> </a:t>
-            </a:r>
-            <a:r>
-              <a:rPr lang="en-US" altLang="ko-KR" sz="3000" dirty="0" smtClean="0"/>
-              <a:t>– </a:t>
+              <a:t> – </a:t>
             </a:r>
             <a:r>
               <a:rPr lang="ko-KR" altLang="en-US" sz="3000" dirty="0" smtClean="0"/>
@@ -4682,11 +4675,7 @@
             </a:r>
             <a:r>
               <a:rPr lang="en-US" altLang="ko-KR" sz="3000" dirty="0" smtClean="0"/>
-              <a:t> </a:t>
-            </a:r>
-            <a:r>
-              <a:rPr lang="en-US" altLang="ko-KR" sz="3000" dirty="0" smtClean="0"/>
-              <a:t>– </a:t>
+              <a:t> – </a:t>
             </a:r>
             <a:r>
               <a:rPr lang="ko-KR" altLang="en-US" sz="3000" dirty="0" smtClean="0"/>
@@ -6025,11 +6014,7 @@
           <a:p>
             <a:r>
               <a:rPr lang="en-US" altLang="ko-KR" dirty="0" smtClean="0"/>
-              <a:t>5.</a:t>
-            </a:r>
-            <a:r>
-              <a:rPr lang="en-US" altLang="ko-KR" dirty="0" smtClean="0"/>
-              <a:t> </a:t>
+              <a:t>5. </a:t>
             </a:r>
             <a:r>
               <a:rPr lang="ko-KR" altLang="en-US" dirty="0" smtClean="0"/>
@@ -6037,15 +6022,7 @@
             </a:r>
             <a:r>
               <a:rPr lang="en-US" altLang="ko-KR" sz="3100" dirty="0" smtClean="0"/>
-              <a:t>– </a:t>
-            </a:r>
-            <a:r>
-              <a:rPr lang="en-US" altLang="ko-KR" sz="3100" dirty="0" smtClean="0"/>
-              <a:t>div</a:t>
-            </a:r>
-            <a:r>
-              <a:rPr lang="en-US" altLang="ko-KR" sz="3100" dirty="0" smtClean="0"/>
-              <a:t>, span</a:t>
+              <a:t>– div, span</a:t>
             </a:r>
             <a:endParaRPr lang="ko-KR" altLang="en-US" sz="4000" dirty="0"/>
           </a:p>
@@ -6314,6 +6291,191 @@
 </p:sld>
 </file>
 
+<file path=ppt/slides/slide26.xml><?xml version="1.0" encoding="utf-8"?>
+<p:sld xmlns:a="http://schemas.openxmlformats.org/drawingml/2006/main" xmlns:r="http://schemas.openxmlformats.org/officeDocument/2006/relationships" xmlns:p="http://schemas.openxmlformats.org/presentationml/2006/main">
+  <p:cSld>
+    <p:spTree>
+      <p:nvGrpSpPr>
+        <p:cNvPr id="1" name=""/>
+        <p:cNvGrpSpPr/>
+        <p:nvPr/>
+      </p:nvGrpSpPr>
+      <p:grpSpPr>
+        <a:xfrm>
+          <a:off x="0" y="0"/>
+          <a:ext cx="0" cy="0"/>
+          <a:chOff x="0" y="0"/>
+          <a:chExt cx="0" cy="0"/>
+        </a:xfrm>
+      </p:grpSpPr>
+      <p:sp>
+        <p:nvSpPr>
+          <p:cNvPr id="2" name="제목 1"/>
+          <p:cNvSpPr>
+            <a:spLocks noGrp="1"/>
+          </p:cNvSpPr>
+          <p:nvPr>
+            <p:ph type="title"/>
+          </p:nvPr>
+        </p:nvSpPr>
+        <p:spPr/>
+        <p:txBody>
+          <a:bodyPr/>
+          <a:lstStyle/>
+          <a:p>
+            <a:r>
+              <a:rPr lang="ko-KR" altLang="en-US" dirty="0" smtClean="0"/>
+              <a:t>참고자료</a:t>
+            </a:r>
+            <a:endParaRPr lang="ko-KR" altLang="en-US" dirty="0"/>
+          </a:p>
+        </p:txBody>
+      </p:sp>
+      <p:sp>
+        <p:nvSpPr>
+          <p:cNvPr id="3" name="내용 개체 틀 2"/>
+          <p:cNvSpPr>
+            <a:spLocks noGrp="1"/>
+          </p:cNvSpPr>
+          <p:nvPr>
+            <p:ph idx="1"/>
+          </p:nvPr>
+        </p:nvSpPr>
+        <p:spPr/>
+        <p:txBody>
+          <a:bodyPr/>
+          <a:lstStyle/>
+          <a:p>
+            <a:r>
+              <a:rPr lang="ko-KR" altLang="en-US" dirty="0">
+                <a:hlinkClick r:id="rId2"/>
+              </a:rPr>
+              <a:t>모던 웹을 위한 </a:t>
+            </a:r>
+            <a:r>
+              <a:rPr lang="en-US" altLang="ko-KR" dirty="0" err="1">
+                <a:hlinkClick r:id="rId2"/>
+              </a:rPr>
+              <a:t>HTML5+CSS3</a:t>
+            </a:r>
+            <a:r>
+              <a:rPr lang="en-US" altLang="ko-KR" dirty="0">
+                <a:hlinkClick r:id="rId2"/>
+              </a:rPr>
+              <a:t> </a:t>
+            </a:r>
+            <a:r>
+              <a:rPr lang="ko-KR" altLang="en-US" dirty="0">
+                <a:hlinkClick r:id="rId2"/>
+              </a:rPr>
+              <a:t>바이블</a:t>
+            </a:r>
+            <a:r>
+              <a:rPr lang="en-US" altLang="ko-KR" dirty="0">
+                <a:hlinkClick r:id="rId2"/>
+              </a:rPr>
+              <a:t>(3</a:t>
+            </a:r>
+            <a:r>
+              <a:rPr lang="ko-KR" altLang="en-US" dirty="0">
+                <a:hlinkClick r:id="rId2"/>
+              </a:rPr>
+              <a:t>판</a:t>
+            </a:r>
+            <a:r>
+              <a:rPr lang="en-US" altLang="ko-KR" dirty="0">
+                <a:hlinkClick r:id="rId2"/>
+              </a:rPr>
+              <a:t>)</a:t>
+            </a:r>
+            <a:r>
+              <a:rPr lang="ko-KR" altLang="en-US" dirty="0" err="1">
+                <a:hlinkClick r:id="rId2"/>
+              </a:rPr>
+              <a:t>윤인성</a:t>
+            </a:r>
+            <a:r>
+              <a:rPr lang="ko-KR" altLang="en-US" dirty="0">
+                <a:hlinkClick r:id="rId2"/>
+              </a:rPr>
+              <a:t> </a:t>
+            </a:r>
+            <a:r>
+              <a:rPr lang="en-US" altLang="ko-KR" dirty="0">
+                <a:hlinkClick r:id="rId2"/>
+              </a:rPr>
+              <a:t>| </a:t>
+            </a:r>
+            <a:r>
+              <a:rPr lang="ko-KR" altLang="en-US" dirty="0" err="1">
+                <a:hlinkClick r:id="rId2"/>
+              </a:rPr>
+              <a:t>한빛미디어</a:t>
+            </a:r>
+            <a:r>
+              <a:rPr lang="ko-KR" altLang="en-US" dirty="0">
+                <a:hlinkClick r:id="rId2"/>
+              </a:rPr>
+              <a:t> </a:t>
+            </a:r>
+          </a:p>
+          <a:p>
+            <a:r>
+              <a:rPr lang="en-US" altLang="ko-KR" b="1" dirty="0" err="1"/>
+              <a:t>HTML5</a:t>
+            </a:r>
+            <a:r>
+              <a:rPr lang="en-US" altLang="ko-KR" b="1" dirty="0"/>
+              <a:t> and </a:t>
+            </a:r>
+            <a:r>
+              <a:rPr lang="en-US" altLang="ko-KR" b="1" dirty="0" err="1"/>
+              <a:t>CSS</a:t>
+            </a:r>
+            <a:r>
+              <a:rPr lang="en-US" altLang="ko-KR" b="1" dirty="0"/>
+              <a:t> </a:t>
+            </a:r>
+            <a:r>
+              <a:rPr lang="en-US" altLang="ko-KR" b="1" dirty="0" smtClean="0"/>
+              <a:t>Fundamentals, </a:t>
+            </a:r>
+            <a:r>
+              <a:rPr lang="en-US" altLang="ko-KR" b="1" dirty="0" err="1" smtClean="0"/>
+              <a:t>edX</a:t>
+            </a:r>
+            <a:r>
+              <a:rPr lang="en-US" altLang="ko-KR" b="1" dirty="0" smtClean="0"/>
+              <a:t>(</a:t>
+            </a:r>
+            <a:r>
+              <a:rPr lang="en-US" altLang="ko-KR" b="1" dirty="0" err="1" smtClean="0"/>
+              <a:t>W3Cx</a:t>
+            </a:r>
+            <a:r>
+              <a:rPr lang="en-US" altLang="ko-KR" b="1" smtClean="0"/>
+              <a:t>)</a:t>
+            </a:r>
+            <a:endParaRPr lang="en-US" altLang="ko-KR" b="1"/>
+          </a:p>
+          <a:p>
+            <a:endParaRPr lang="ko-KR" altLang="en-US" dirty="0"/>
+          </a:p>
+        </p:txBody>
+      </p:sp>
+    </p:spTree>
+    <p:extLst>
+      <p:ext uri="{BB962C8B-B14F-4D97-AF65-F5344CB8AC3E}">
+        <p14:creationId xmlns:p14="http://schemas.microsoft.com/office/powerpoint/2010/main" val="217639925"/>
+      </p:ext>
+    </p:extLst>
+  </p:cSld>
+  <p:clrMapOvr>
+    <a:masterClrMapping/>
+  </p:clrMapOvr>
+</p:sld>
+</file>
+
 <file path=ppt/slides/slide3.xml><?xml version="1.0" encoding="utf-8"?>
 <p:sld xmlns:a="http://schemas.openxmlformats.org/drawingml/2006/main" xmlns:r="http://schemas.openxmlformats.org/officeDocument/2006/relationships" xmlns:p="http://schemas.openxmlformats.org/presentationml/2006/main">
   <p:cSld>
@@ -6780,11 +6942,7 @@
           <a:p>
             <a:r>
               <a:rPr lang="en-US" altLang="ko-KR" dirty="0" smtClean="0"/>
-              <a:t>2. </a:t>
-            </a:r>
-            <a:r>
-              <a:rPr lang="en-US" altLang="ko-KR" dirty="0" smtClean="0"/>
-              <a:t>HTML5 </a:t>
+              <a:t>2. HTML5 </a:t>
             </a:r>
             <a:r>
               <a:rPr lang="ko-KR" altLang="en-US" dirty="0" smtClean="0"/>
@@ -6825,11 +6983,7 @@
             </a:r>
             <a:r>
               <a:rPr lang="ko-KR" altLang="en-US" sz="1600" dirty="0" smtClean="0"/>
-              <a:t>없이 음악과 동영상 </a:t>
-            </a:r>
-            <a:r>
-              <a:rPr lang="ko-KR" altLang="en-US" sz="1600" dirty="0" smtClean="0"/>
-              <a:t>재생</a:t>
+              <a:t>없이 음악과 동영상 재생</a:t>
             </a:r>
             <a:endParaRPr lang="en-US" altLang="ko-KR" sz="1600" dirty="0" smtClean="0"/>
           </a:p>
@@ -6928,11 +7082,7 @@
             </a:r>
             <a:r>
               <a:rPr lang="ko-KR" altLang="en-US" sz="1600" dirty="0" smtClean="0"/>
-              <a:t>차원 </a:t>
-            </a:r>
-            <a:r>
-              <a:rPr lang="ko-KR" altLang="en-US" sz="1600" dirty="0" smtClean="0"/>
-              <a:t>구현</a:t>
+              <a:t>차원 구현</a:t>
             </a:r>
             <a:endParaRPr lang="en-US" altLang="ko-KR" sz="1600" dirty="0" smtClean="0"/>
           </a:p>
@@ -6951,15 +7101,7 @@
             <a:pPr lvl="1"/>
             <a:r>
               <a:rPr lang="ko-KR" altLang="en-US" sz="1600" dirty="0" smtClean="0"/>
-              <a:t>서버와 </a:t>
-            </a:r>
-            <a:r>
-              <a:rPr lang="ko-KR" altLang="en-US" sz="1600" dirty="0" smtClean="0"/>
-              <a:t>양방향 </a:t>
-            </a:r>
-            <a:r>
-              <a:rPr lang="ko-KR" altLang="en-US" sz="1600" dirty="0" smtClean="0"/>
-              <a:t>통신</a:t>
+              <a:t>서버와 양방향 통신</a:t>
             </a:r>
             <a:r>
               <a:rPr lang="en-US" altLang="ko-KR" sz="1600" dirty="0" smtClean="0"/>
@@ -7013,11 +7155,7 @@
             </a:pPr>
             <a:r>
               <a:rPr lang="ko-KR" altLang="en-US" sz="1600" dirty="0" smtClean="0"/>
-              <a:t>방식으로만 </a:t>
-            </a:r>
-            <a:r>
-              <a:rPr lang="ko-KR" altLang="en-US" sz="1600" dirty="0" smtClean="0"/>
-              <a:t>구현</a:t>
+              <a:t>방식으로만 구현</a:t>
             </a:r>
             <a:endParaRPr lang="en-US" altLang="ko-KR" sz="1600" dirty="0" smtClean="0"/>
           </a:p>
@@ -7202,11 +7340,7 @@
           <a:p>
             <a:r>
               <a:rPr lang="en-US" altLang="ko-KR" dirty="0" smtClean="0"/>
-              <a:t>2. </a:t>
-            </a:r>
-            <a:r>
-              <a:rPr lang="en-US" altLang="ko-KR" dirty="0" smtClean="0"/>
-              <a:t>HTML5 </a:t>
+              <a:t>2. HTML5 </a:t>
             </a:r>
             <a:r>
               <a:rPr lang="ko-KR" altLang="en-US" dirty="0" smtClean="0"/>
@@ -7254,11 +7388,7 @@
             <a:pPr lvl="1"/>
             <a:r>
               <a:rPr lang="ko-KR" altLang="en-US" sz="1600" dirty="0" smtClean="0"/>
-              <a:t>주로 최근 내역이나 설정 값 등을 </a:t>
-            </a:r>
-            <a:r>
-              <a:rPr lang="ko-KR" altLang="en-US" sz="1600" dirty="0" smtClean="0"/>
-              <a:t>저장</a:t>
+              <a:t>주로 최근 내역이나 설정 값 등을 저장</a:t>
             </a:r>
             <a:endParaRPr lang="en-US" altLang="ko-KR" sz="1600" dirty="0" smtClean="0"/>
           </a:p>
@@ -7293,11 +7423,7 @@
             <a:pPr lvl="1"/>
             <a:r>
               <a:rPr lang="ko-KR" altLang="en-US" sz="1600" dirty="0" smtClean="0"/>
-              <a:t>주로 검색 엔진 같은 프로그램들이 문서의 구성형태를 알기 쉽게 파악하기 위한 용도로 </a:t>
-            </a:r>
-            <a:r>
-              <a:rPr lang="ko-KR" altLang="en-US" sz="1600" dirty="0" smtClean="0"/>
-              <a:t>사용됨</a:t>
+              <a:t>주로 검색 엔진 같은 프로그램들이 문서의 구성형태를 알기 쉽게 파악하기 위한 용도로 사용됨</a:t>
             </a:r>
             <a:endParaRPr lang="en-US" altLang="ko-KR" sz="1600" dirty="0" smtClean="0"/>
           </a:p>
@@ -7332,11 +7458,7 @@
             </a:r>
             <a:r>
               <a:rPr lang="ko-KR" altLang="en-US" sz="1600" dirty="0" smtClean="0"/>
-              <a:t>애니메이션 </a:t>
-            </a:r>
-            <a:r>
-              <a:rPr lang="ko-KR" altLang="en-US" sz="1600" dirty="0" smtClean="0"/>
-              <a:t>처리</a:t>
+              <a:t>애니메이션 처리</a:t>
             </a:r>
             <a:endParaRPr lang="en-US" altLang="ko-KR" sz="1600" dirty="0" smtClean="0"/>
           </a:p>
@@ -7585,11 +7707,7 @@
           <a:p>
             <a:r>
               <a:rPr lang="ko-KR" altLang="en-US" dirty="0" smtClean="0"/>
-              <a:t>태그와 </a:t>
-            </a:r>
-            <a:r>
-              <a:rPr lang="ko-KR" altLang="en-US" dirty="0" smtClean="0"/>
-              <a:t>요소</a:t>
+              <a:t>태그와 요소</a:t>
             </a:r>
             <a:endParaRPr lang="en-US" altLang="ko-KR" dirty="0" smtClean="0"/>
           </a:p>
@@ -7664,11 +7782,7 @@
             </a:r>
             <a:r>
               <a:rPr lang="en-US" altLang="ko-KR" dirty="0" smtClean="0"/>
-              <a:t>&gt;</a:t>
-            </a:r>
-            <a:r>
-              <a:rPr lang="en-US" altLang="ko-KR" dirty="0" smtClean="0"/>
-              <a:t>  </a:t>
+              <a:t>&gt;  </a:t>
             </a:r>
             <a:r>
               <a:rPr lang="ko-KR" altLang="en-US" dirty="0" err="1" smtClean="0"/>
@@ -7718,7 +7832,6 @@
               <a:rPr lang="en-US" altLang="ko-KR" dirty="0" smtClean="0"/>
               <a:t>(element)</a:t>
             </a:r>
-            <a:endParaRPr lang="en-US" altLang="ko-KR" dirty="0" smtClean="0"/>
           </a:p>
           <a:p>
             <a:pPr lvl="1">
@@ -7809,19 +7922,7 @@
             </a:r>
             <a:r>
               <a:rPr lang="ko-KR" altLang="en-US" dirty="0" smtClean="0"/>
-              <a:t>태그의 </a:t>
-            </a:r>
-            <a:r>
-              <a:rPr lang="ko-KR" altLang="en-US" dirty="0" smtClean="0"/>
-              <a:t>추가</a:t>
-            </a:r>
-            <a:r>
-              <a:rPr lang="ko-KR" altLang="en-US" dirty="0" smtClean="0"/>
-              <a:t> </a:t>
-            </a:r>
-            <a:r>
-              <a:rPr lang="ko-KR" altLang="en-US" dirty="0" smtClean="0"/>
-              <a:t>정보</a:t>
+              <a:t>태그의 추가 정보</a:t>
             </a:r>
             <a:endParaRPr lang="en-US" altLang="ko-KR" dirty="0" smtClean="0"/>
           </a:p>
@@ -7948,19 +8049,7 @@
             </a:r>
             <a:r>
               <a:rPr lang="ko-KR" altLang="en-US" dirty="0" smtClean="0"/>
-              <a:t>코드에 대한 설명 </a:t>
-            </a:r>
-            <a:r>
-              <a:rPr lang="ko-KR" altLang="en-US" dirty="0" smtClean="0"/>
-              <a:t>또는 </a:t>
-            </a:r>
-            <a:r>
-              <a:rPr lang="ko-KR" altLang="en-US" dirty="0" smtClean="0"/>
-              <a:t>코드를 미사용 </a:t>
-            </a:r>
-            <a:r>
-              <a:rPr lang="ko-KR" altLang="en-US" dirty="0" smtClean="0"/>
-              <a:t>처리</a:t>
+              <a:t>코드에 대한 설명 또는 코드를 미사용 처리</a:t>
             </a:r>
             <a:endParaRPr lang="en-US" altLang="ko-KR" dirty="0" smtClean="0"/>
           </a:p>

</xml_diff>

<commit_message>
2021-07-15 html layout 1
</commit_message>
<xml_diff>
--- a/1-html-css/01. HTML5 개요 및 레이아웃.pptx
+++ b/1-html-css/01. HTML5 개요 및 레이아웃.pptx
@@ -330,7 +330,7 @@
             <a:fld id="{1879488F-3623-45BC-9557-A09A3AFFDD11}" type="datetimeFigureOut">
               <a:rPr lang="ko-KR" altLang="en-US" smtClean="0"/>
               <a:pPr/>
-              <a:t>2021-07-14</a:t>
+              <a:t>2021-07-15</a:t>
             </a:fld>
             <a:endParaRPr lang="ko-KR" altLang="en-US"/>
           </a:p>
@@ -497,7 +497,7 @@
             <a:fld id="{1879488F-3623-45BC-9557-A09A3AFFDD11}" type="datetimeFigureOut">
               <a:rPr lang="ko-KR" altLang="en-US" smtClean="0"/>
               <a:pPr/>
-              <a:t>2021-07-14</a:t>
+              <a:t>2021-07-15</a:t>
             </a:fld>
             <a:endParaRPr lang="ko-KR" altLang="en-US"/>
           </a:p>
@@ -674,7 +674,7 @@
             <a:fld id="{1879488F-3623-45BC-9557-A09A3AFFDD11}" type="datetimeFigureOut">
               <a:rPr lang="ko-KR" altLang="en-US" smtClean="0"/>
               <a:pPr/>
-              <a:t>2021-07-14</a:t>
+              <a:t>2021-07-15</a:t>
             </a:fld>
             <a:endParaRPr lang="ko-KR" altLang="en-US"/>
           </a:p>
@@ -841,7 +841,7 @@
             <a:fld id="{1879488F-3623-45BC-9557-A09A3AFFDD11}" type="datetimeFigureOut">
               <a:rPr lang="ko-KR" altLang="en-US" smtClean="0"/>
               <a:pPr/>
-              <a:t>2021-07-14</a:t>
+              <a:t>2021-07-15</a:t>
             </a:fld>
             <a:endParaRPr lang="ko-KR" altLang="en-US"/>
           </a:p>
@@ -1084,7 +1084,7 @@
             <a:fld id="{1879488F-3623-45BC-9557-A09A3AFFDD11}" type="datetimeFigureOut">
               <a:rPr lang="ko-KR" altLang="en-US" smtClean="0"/>
               <a:pPr/>
-              <a:t>2021-07-14</a:t>
+              <a:t>2021-07-15</a:t>
             </a:fld>
             <a:endParaRPr lang="ko-KR" altLang="en-US"/>
           </a:p>
@@ -1369,7 +1369,7 @@
             <a:fld id="{1879488F-3623-45BC-9557-A09A3AFFDD11}" type="datetimeFigureOut">
               <a:rPr lang="ko-KR" altLang="en-US" smtClean="0"/>
               <a:pPr/>
-              <a:t>2021-07-14</a:t>
+              <a:t>2021-07-15</a:t>
             </a:fld>
             <a:endParaRPr lang="ko-KR" altLang="en-US"/>
           </a:p>
@@ -1788,7 +1788,7 @@
             <a:fld id="{1879488F-3623-45BC-9557-A09A3AFFDD11}" type="datetimeFigureOut">
               <a:rPr lang="ko-KR" altLang="en-US" smtClean="0"/>
               <a:pPr/>
-              <a:t>2021-07-14</a:t>
+              <a:t>2021-07-15</a:t>
             </a:fld>
             <a:endParaRPr lang="ko-KR" altLang="en-US"/>
           </a:p>
@@ -1903,7 +1903,7 @@
             <a:fld id="{1879488F-3623-45BC-9557-A09A3AFFDD11}" type="datetimeFigureOut">
               <a:rPr lang="ko-KR" altLang="en-US" smtClean="0"/>
               <a:pPr/>
-              <a:t>2021-07-14</a:t>
+              <a:t>2021-07-15</a:t>
             </a:fld>
             <a:endParaRPr lang="ko-KR" altLang="en-US"/>
           </a:p>
@@ -1995,7 +1995,7 @@
             <a:fld id="{1879488F-3623-45BC-9557-A09A3AFFDD11}" type="datetimeFigureOut">
               <a:rPr lang="ko-KR" altLang="en-US" smtClean="0"/>
               <a:pPr/>
-              <a:t>2021-07-14</a:t>
+              <a:t>2021-07-15</a:t>
             </a:fld>
             <a:endParaRPr lang="ko-KR" altLang="en-US"/>
           </a:p>
@@ -2269,7 +2269,7 @@
             <a:fld id="{1879488F-3623-45BC-9557-A09A3AFFDD11}" type="datetimeFigureOut">
               <a:rPr lang="ko-KR" altLang="en-US" smtClean="0"/>
               <a:pPr/>
-              <a:t>2021-07-14</a:t>
+              <a:t>2021-07-15</a:t>
             </a:fld>
             <a:endParaRPr lang="ko-KR" altLang="en-US"/>
           </a:p>
@@ -2519,7 +2519,7 @@
             <a:fld id="{1879488F-3623-45BC-9557-A09A3AFFDD11}" type="datetimeFigureOut">
               <a:rPr lang="ko-KR" altLang="en-US" smtClean="0"/>
               <a:pPr/>
-              <a:t>2021-07-14</a:t>
+              <a:t>2021-07-15</a:t>
             </a:fld>
             <a:endParaRPr lang="ko-KR" altLang="en-US"/>
           </a:p>
@@ -2729,7 +2729,7 @@
             <a:fld id="{1879488F-3623-45BC-9557-A09A3AFFDD11}" type="datetimeFigureOut">
               <a:rPr lang="ko-KR" altLang="en-US" smtClean="0"/>
               <a:pPr/>
-              <a:t>2021-07-14</a:t>
+              <a:t>2021-07-15</a:t>
             </a:fld>
             <a:endParaRPr lang="ko-KR" altLang="en-US"/>
           </a:p>
@@ -7707,7 +7707,19 @@
           <a:p>
             <a:r>
               <a:rPr lang="ko-KR" altLang="en-US" dirty="0" smtClean="0"/>
-              <a:t>태그와 요소</a:t>
+              <a:t>태그</a:t>
+            </a:r>
+            <a:r>
+              <a:rPr lang="en-US" altLang="ko-KR" dirty="0" smtClean="0"/>
+              <a:t>(tag)</a:t>
+            </a:r>
+            <a:r>
+              <a:rPr lang="ko-KR" altLang="en-US" dirty="0" smtClean="0"/>
+              <a:t>와 </a:t>
+            </a:r>
+            <a:r>
+              <a:rPr lang="ko-KR" altLang="en-US" dirty="0" smtClean="0"/>
+              <a:t>요소</a:t>
             </a:r>
             <a:endParaRPr lang="en-US" altLang="ko-KR" dirty="0" smtClean="0"/>
           </a:p>
@@ -7789,16 +7801,40 @@
               <a:t>컨텐트</a:t>
             </a:r>
             <a:r>
-              <a:rPr lang="en-US" altLang="ko-KR" dirty="0"/>
-              <a:t> </a:t>
+              <a:rPr lang="en-US" altLang="ko-KR" dirty="0" smtClean="0"/>
+              <a:t>(</a:t>
+            </a:r>
+            <a:r>
+              <a:rPr lang="ko-KR" altLang="en-US" dirty="0" smtClean="0"/>
+              <a:t>내용</a:t>
+            </a:r>
+            <a:r>
+              <a:rPr lang="en-US" altLang="ko-KR" smtClean="0"/>
+              <a:t>) </a:t>
             </a:r>
             <a:r>
               <a:rPr lang="en-US" altLang="ko-KR" dirty="0" smtClean="0"/>
               <a:t>&lt;/</a:t>
             </a:r>
             <a:r>
-              <a:rPr lang="ko-KR" altLang="en-US" dirty="0" err="1" smtClean="0"/>
-              <a:t>끝태그</a:t>
+              <a:rPr lang="ko-KR" altLang="en-US" dirty="0" smtClean="0"/>
+              <a:t>끝</a:t>
+            </a:r>
+            <a:r>
+              <a:rPr lang="en-US" altLang="ko-KR" dirty="0" smtClean="0"/>
+              <a:t>(</a:t>
+            </a:r>
+            <a:r>
+              <a:rPr lang="ko-KR" altLang="en-US" dirty="0" smtClean="0"/>
+              <a:t>닫는</a:t>
+            </a:r>
+            <a:r>
+              <a:rPr lang="en-US" altLang="ko-KR" dirty="0" smtClean="0"/>
+              <a:t>)</a:t>
+            </a:r>
+            <a:r>
+              <a:rPr lang="ko-KR" altLang="en-US" dirty="0" smtClean="0"/>
+              <a:t>태그</a:t>
             </a:r>
             <a:r>
               <a:rPr lang="en-US" altLang="ko-KR" dirty="0" smtClean="0"/>

</xml_diff>

<commit_message>
20210721 spacing, pseudo class
</commit_message>
<xml_diff>
--- a/1-html-css/01. HTML5 개요 및 레이아웃.pptx
+++ b/1-html-css/01. HTML5 개요 및 레이아웃.pptx
@@ -330,7 +330,7 @@
             <a:fld id="{1879488F-3623-45BC-9557-A09A3AFFDD11}" type="datetimeFigureOut">
               <a:rPr lang="ko-KR" altLang="en-US" smtClean="0"/>
               <a:pPr/>
-              <a:t>2021-07-19</a:t>
+              <a:t>2021-07-20</a:t>
             </a:fld>
             <a:endParaRPr lang="ko-KR" altLang="en-US"/>
           </a:p>
@@ -497,7 +497,7 @@
             <a:fld id="{1879488F-3623-45BC-9557-A09A3AFFDD11}" type="datetimeFigureOut">
               <a:rPr lang="ko-KR" altLang="en-US" smtClean="0"/>
               <a:pPr/>
-              <a:t>2021-07-19</a:t>
+              <a:t>2021-07-20</a:t>
             </a:fld>
             <a:endParaRPr lang="ko-KR" altLang="en-US"/>
           </a:p>
@@ -674,7 +674,7 @@
             <a:fld id="{1879488F-3623-45BC-9557-A09A3AFFDD11}" type="datetimeFigureOut">
               <a:rPr lang="ko-KR" altLang="en-US" smtClean="0"/>
               <a:pPr/>
-              <a:t>2021-07-19</a:t>
+              <a:t>2021-07-20</a:t>
             </a:fld>
             <a:endParaRPr lang="ko-KR" altLang="en-US"/>
           </a:p>
@@ -841,7 +841,7 @@
             <a:fld id="{1879488F-3623-45BC-9557-A09A3AFFDD11}" type="datetimeFigureOut">
               <a:rPr lang="ko-KR" altLang="en-US" smtClean="0"/>
               <a:pPr/>
-              <a:t>2021-07-19</a:t>
+              <a:t>2021-07-20</a:t>
             </a:fld>
             <a:endParaRPr lang="ko-KR" altLang="en-US"/>
           </a:p>
@@ -1084,7 +1084,7 @@
             <a:fld id="{1879488F-3623-45BC-9557-A09A3AFFDD11}" type="datetimeFigureOut">
               <a:rPr lang="ko-KR" altLang="en-US" smtClean="0"/>
               <a:pPr/>
-              <a:t>2021-07-19</a:t>
+              <a:t>2021-07-20</a:t>
             </a:fld>
             <a:endParaRPr lang="ko-KR" altLang="en-US"/>
           </a:p>
@@ -1369,7 +1369,7 @@
             <a:fld id="{1879488F-3623-45BC-9557-A09A3AFFDD11}" type="datetimeFigureOut">
               <a:rPr lang="ko-KR" altLang="en-US" smtClean="0"/>
               <a:pPr/>
-              <a:t>2021-07-19</a:t>
+              <a:t>2021-07-20</a:t>
             </a:fld>
             <a:endParaRPr lang="ko-KR" altLang="en-US"/>
           </a:p>
@@ -1788,7 +1788,7 @@
             <a:fld id="{1879488F-3623-45BC-9557-A09A3AFFDD11}" type="datetimeFigureOut">
               <a:rPr lang="ko-KR" altLang="en-US" smtClean="0"/>
               <a:pPr/>
-              <a:t>2021-07-19</a:t>
+              <a:t>2021-07-20</a:t>
             </a:fld>
             <a:endParaRPr lang="ko-KR" altLang="en-US"/>
           </a:p>
@@ -1903,7 +1903,7 @@
             <a:fld id="{1879488F-3623-45BC-9557-A09A3AFFDD11}" type="datetimeFigureOut">
               <a:rPr lang="ko-KR" altLang="en-US" smtClean="0"/>
               <a:pPr/>
-              <a:t>2021-07-19</a:t>
+              <a:t>2021-07-20</a:t>
             </a:fld>
             <a:endParaRPr lang="ko-KR" altLang="en-US"/>
           </a:p>
@@ -1995,7 +1995,7 @@
             <a:fld id="{1879488F-3623-45BC-9557-A09A3AFFDD11}" type="datetimeFigureOut">
               <a:rPr lang="ko-KR" altLang="en-US" smtClean="0"/>
               <a:pPr/>
-              <a:t>2021-07-19</a:t>
+              <a:t>2021-07-20</a:t>
             </a:fld>
             <a:endParaRPr lang="ko-KR" altLang="en-US"/>
           </a:p>
@@ -2269,7 +2269,7 @@
             <a:fld id="{1879488F-3623-45BC-9557-A09A3AFFDD11}" type="datetimeFigureOut">
               <a:rPr lang="ko-KR" altLang="en-US" smtClean="0"/>
               <a:pPr/>
-              <a:t>2021-07-19</a:t>
+              <a:t>2021-07-20</a:t>
             </a:fld>
             <a:endParaRPr lang="ko-KR" altLang="en-US"/>
           </a:p>
@@ -2519,7 +2519,7 @@
             <a:fld id="{1879488F-3623-45BC-9557-A09A3AFFDD11}" type="datetimeFigureOut">
               <a:rPr lang="ko-KR" altLang="en-US" smtClean="0"/>
               <a:pPr/>
-              <a:t>2021-07-19</a:t>
+              <a:t>2021-07-20</a:t>
             </a:fld>
             <a:endParaRPr lang="ko-KR" altLang="en-US"/>
           </a:p>
@@ -2729,7 +2729,7 @@
             <a:fld id="{1879488F-3623-45BC-9557-A09A3AFFDD11}" type="datetimeFigureOut">
               <a:rPr lang="ko-KR" altLang="en-US" smtClean="0"/>
               <a:pPr/>
-              <a:t>2021-07-19</a:t>
+              <a:t>2021-07-20</a:t>
             </a:fld>
             <a:endParaRPr lang="ko-KR" altLang="en-US"/>
           </a:p>
@@ -4854,11 +4854,7 @@
             </a:pPr>
             <a:r>
               <a:rPr lang="ko-KR" altLang="en-US" sz="1700" dirty="0" smtClean="0"/>
-              <a:t>요리 목록 메뉴를 클릭 시에 해당 요리로 내부 </a:t>
-            </a:r>
-            <a:r>
-              <a:rPr lang="ko-KR" altLang="en-US" sz="1700" dirty="0" smtClean="0"/>
-              <a:t>이동</a:t>
+              <a:t>요리 목록 메뉴를 클릭 시에 해당 요리로 내부 이동</a:t>
             </a:r>
             <a:endParaRPr lang="en-US" altLang="ko-KR" sz="1700" dirty="0" smtClean="0"/>
           </a:p>
@@ -4974,13 +4970,8 @@
             </a:r>
             <a:r>
               <a:rPr lang="en-US" altLang="ko-KR" sz="1300" dirty="0" smtClean="0"/>
-              <a:t>URL</a:t>
-            </a:r>
-            <a:r>
-              <a:rPr lang="en-US" altLang="ko-KR" sz="1300" dirty="0" smtClean="0"/>
-              <a:t>)</a:t>
-            </a:r>
-            <a:endParaRPr lang="en-US" altLang="ko-KR" sz="1300" dirty="0" smtClean="0"/>
+              <a:t>URL)</a:t>
+            </a:r>
           </a:p>
         </p:txBody>
       </p:sp>
@@ -5909,8 +5900,21 @@
             </a:r>
             <a:r>
               <a:rPr lang="ko-KR" altLang="en-US" sz="1800" dirty="0" smtClean="0"/>
-              <a:t>태그 등을 활용</a:t>
-            </a:r>
+              <a:t>태그 등을 </a:t>
+            </a:r>
+            <a:r>
+              <a:rPr lang="ko-KR" altLang="en-US" sz="1800" dirty="0" smtClean="0"/>
+              <a:t>활용</a:t>
+            </a:r>
+            <a:endParaRPr lang="en-US" altLang="ko-KR" sz="1800" dirty="0" smtClean="0"/>
+          </a:p>
+          <a:p>
+            <a:pPr marL="457200" lvl="1" indent="0">
+              <a:lnSpc>
+                <a:spcPct val="120000"/>
+              </a:lnSpc>
+              <a:buNone/>
+            </a:pPr>
             <a:endParaRPr lang="en-US" altLang="ko-KR" sz="1800" dirty="0" smtClean="0"/>
           </a:p>
           <a:p>

</xml_diff>